<commit_message>
renaming should be complete documentation update progress
</commit_message>
<xml_diff>
--- a/Documentation/Financial Database Manager.pptx
+++ b/Documentation/Financial Database Manager.pptx
@@ -7,6 +7,10 @@
   <p:sldIdLst>
     <p:sldId id="256" r:id="rId2"/>
     <p:sldId id="257" r:id="rId3"/>
+    <p:sldId id="258" r:id="rId4"/>
+    <p:sldId id="259" r:id="rId5"/>
+    <p:sldId id="260" r:id="rId6"/>
+    <p:sldId id="261" r:id="rId7"/>
   </p:sldIdLst>
   <p:sldSz cx="12192000" cy="6858000"/>
   <p:notesSz cx="6858000" cy="9144000"/>
@@ -6518,25 +6522,53 @@
         </p:nvSpPr>
         <p:spPr/>
         <p:txBody>
-          <a:bodyPr/>
-          <a:lstStyle/>
-          <a:p>
+          <a:bodyPr>
+            <a:normAutofit/>
+          </a:bodyPr>
+          <a:lstStyle/>
+          <a:p>
+            <a:r>
+              <a:rPr lang="en-US" sz="2400" dirty="0"/>
+              <a:t>What is this project?</a:t>
+            </a:r>
+          </a:p>
+          <a:p>
+            <a:pPr marL="450000" lvl="1" indent="0">
+              <a:buNone/>
+            </a:pPr>
             <a:r>
               <a:rPr lang="en-US" dirty="0"/>
-              <a:t>What is this project?</a:t>
-            </a:r>
-          </a:p>
-          <a:p>
-            <a:pPr marL="36900" indent="0">
+              <a:t>This project is a Financial Database Manager. It allows you to load and edit a database that allows you to save the date of the expense or income, an amount to go with the entry, and a description of what the cost or income was.</a:t>
+            </a:r>
+          </a:p>
+          <a:p>
+            <a:r>
+              <a:rPr lang="en-US" sz="2400" dirty="0"/>
+              <a:t>Why did I do this project?</a:t>
+            </a:r>
+          </a:p>
+          <a:p>
+            <a:pPr marL="450000" lvl="1" indent="0">
               <a:buNone/>
             </a:pPr>
             <a:r>
               <a:rPr lang="en-US" dirty="0"/>
-              <a:t>	This project is a Financial Database Manager. It allows you to load and edit a database that allows you to save the date of the expense or income, an amount to go with the entry, and a description of what the cost or </a:t>
-            </a:r>
-            <a:r>
-              <a:rPr lang="en-US"/>
-              <a:t>income was.</a:t>
+              <a:t>It’s a practical application of software engineering that allows users to keep track of expenses without too much effort.</a:t>
+            </a:r>
+          </a:p>
+          <a:p>
+            <a:r>
+              <a:rPr lang="en-US" sz="2400" dirty="0"/>
+              <a:t>What do you need to know about this project?</a:t>
+            </a:r>
+          </a:p>
+          <a:p>
+            <a:pPr marL="450000" lvl="1" indent="0">
+              <a:buNone/>
+            </a:pPr>
+            <a:r>
+              <a:rPr lang="en-US" dirty="0"/>
+              <a:t>Build first, then run executable. This way your database plays nice.</a:t>
             </a:r>
           </a:p>
         </p:txBody>
@@ -6545,6 +6577,464 @@
     <p:extLst>
       <p:ext uri="{BB962C8B-B14F-4D97-AF65-F5344CB8AC3E}">
         <p14:creationId xmlns:p14="http://schemas.microsoft.com/office/powerpoint/2010/main" val="297209396"/>
+      </p:ext>
+    </p:extLst>
+  </p:cSld>
+  <p:clrMapOvr>
+    <a:masterClrMapping/>
+  </p:clrMapOvr>
+</p:sld>
+</file>
+
+<file path=ppt/slides/slide3.xml><?xml version="1.0" encoding="utf-8"?>
+<p:sld xmlns:a="http://schemas.openxmlformats.org/drawingml/2006/main" xmlns:r="http://schemas.openxmlformats.org/officeDocument/2006/relationships" xmlns:p="http://schemas.openxmlformats.org/presentationml/2006/main">
+  <p:cSld>
+    <p:spTree>
+      <p:nvGrpSpPr>
+        <p:cNvPr id="1" name=""/>
+        <p:cNvGrpSpPr/>
+        <p:nvPr/>
+      </p:nvGrpSpPr>
+      <p:grpSpPr>
+        <a:xfrm>
+          <a:off x="0" y="0"/>
+          <a:ext cx="0" cy="0"/>
+          <a:chOff x="0" y="0"/>
+          <a:chExt cx="0" cy="0"/>
+        </a:xfrm>
+      </p:grpSpPr>
+      <p:sp>
+        <p:nvSpPr>
+          <p:cNvPr id="2" name="Title 1">
+            <a:extLst>
+              <a:ext uri="{FF2B5EF4-FFF2-40B4-BE49-F238E27FC236}">
+                <a16:creationId xmlns:a16="http://schemas.microsoft.com/office/drawing/2014/main" id="{0FE4E3F7-3EAE-4E01-B667-E81DA2BF35AB}"/>
+              </a:ext>
+            </a:extLst>
+          </p:cNvPr>
+          <p:cNvSpPr>
+            <a:spLocks noGrp="1"/>
+          </p:cNvSpPr>
+          <p:nvPr>
+            <p:ph type="title"/>
+          </p:nvPr>
+        </p:nvSpPr>
+        <p:spPr/>
+        <p:txBody>
+          <a:bodyPr/>
+          <a:lstStyle/>
+          <a:p>
+            <a:r>
+              <a:rPr lang="en-US" dirty="0"/>
+              <a:t>Approach</a:t>
+            </a:r>
+          </a:p>
+        </p:txBody>
+      </p:sp>
+      <p:sp>
+        <p:nvSpPr>
+          <p:cNvPr id="3" name="Content Placeholder 2">
+            <a:extLst>
+              <a:ext uri="{FF2B5EF4-FFF2-40B4-BE49-F238E27FC236}">
+                <a16:creationId xmlns:a16="http://schemas.microsoft.com/office/drawing/2014/main" id="{75D5F1E9-4FFF-4989-941C-772B95C0FDA9}"/>
+              </a:ext>
+            </a:extLst>
+          </p:cNvPr>
+          <p:cNvSpPr>
+            <a:spLocks noGrp="1"/>
+          </p:cNvSpPr>
+          <p:nvPr>
+            <p:ph idx="1"/>
+          </p:nvPr>
+        </p:nvSpPr>
+        <p:spPr/>
+        <p:txBody>
+          <a:bodyPr/>
+          <a:lstStyle/>
+          <a:p>
+            <a:r>
+              <a:rPr lang="en-US" sz="2400" dirty="0"/>
+              <a:t>How did I do it?</a:t>
+            </a:r>
+          </a:p>
+          <a:p>
+            <a:pPr marL="450000" lvl="1" indent="0">
+              <a:buNone/>
+            </a:pPr>
+            <a:r>
+              <a:rPr lang="en-US" dirty="0"/>
+              <a:t>By asking lots of questions (sorry Dr. Ericson) and Googling very many things that may have caused more problems than they helped fix.</a:t>
+            </a:r>
+            <a:endParaRPr lang="en-US" strike="sngStrike" dirty="0"/>
+          </a:p>
+          <a:p>
+            <a:r>
+              <a:rPr lang="en-US" sz="2400" dirty="0"/>
+              <a:t>Special libraries/drivers?</a:t>
+            </a:r>
+          </a:p>
+          <a:p>
+            <a:pPr marL="450000" lvl="1" indent="0">
+              <a:buNone/>
+            </a:pPr>
+            <a:r>
+              <a:rPr lang="en-US" dirty="0"/>
+              <a:t>I used Extended WPF </a:t>
+            </a:r>
+            <a:r>
+              <a:rPr lang="en-US" dirty="0" err="1"/>
+              <a:t>Toolkit</a:t>
+            </a:r>
+            <a:r>
+              <a:rPr lang="en-US" baseline="30000" dirty="0" err="1"/>
+              <a:t>TM</a:t>
+            </a:r>
+            <a:r>
+              <a:rPr lang="en-US" dirty="0"/>
+              <a:t> by </a:t>
+            </a:r>
+            <a:r>
+              <a:rPr lang="en-US" dirty="0" err="1"/>
+              <a:t>Xceed</a:t>
+            </a:r>
+            <a:r>
+              <a:rPr lang="en-US" dirty="0"/>
+              <a:t>. (</a:t>
+            </a:r>
+            <a:r>
+              <a:rPr lang="en-US" dirty="0">
+                <a:hlinkClick r:id="rId2"/>
+              </a:rPr>
+              <a:t>https://github.com/xceedsoftware/wpftoolkit</a:t>
+            </a:r>
+            <a:r>
+              <a:rPr lang="en-US" dirty="0"/>
+              <a:t>)</a:t>
+            </a:r>
+          </a:p>
+          <a:p>
+            <a:r>
+              <a:rPr lang="en-US" sz="2400" dirty="0"/>
+              <a:t>Design patterns used:</a:t>
+            </a:r>
+          </a:p>
+          <a:p>
+            <a:pPr marL="450000" lvl="1" indent="0">
+              <a:buNone/>
+            </a:pPr>
+            <a:r>
+              <a:rPr lang="en-US" dirty="0"/>
+              <a:t>Façade – to make adding and displaying entries easy for the user</a:t>
+            </a:r>
+          </a:p>
+        </p:txBody>
+      </p:sp>
+    </p:spTree>
+    <p:extLst>
+      <p:ext uri="{BB962C8B-B14F-4D97-AF65-F5344CB8AC3E}">
+        <p14:creationId xmlns:p14="http://schemas.microsoft.com/office/powerpoint/2010/main" val="745686044"/>
+      </p:ext>
+    </p:extLst>
+  </p:cSld>
+  <p:clrMapOvr>
+    <a:masterClrMapping/>
+  </p:clrMapOvr>
+</p:sld>
+</file>
+
+<file path=ppt/slides/slide4.xml><?xml version="1.0" encoding="utf-8"?>
+<p:sld xmlns:a="http://schemas.openxmlformats.org/drawingml/2006/main" xmlns:r="http://schemas.openxmlformats.org/officeDocument/2006/relationships" xmlns:p="http://schemas.openxmlformats.org/presentationml/2006/main">
+  <p:cSld>
+    <p:spTree>
+      <p:nvGrpSpPr>
+        <p:cNvPr id="1" name=""/>
+        <p:cNvGrpSpPr/>
+        <p:nvPr/>
+      </p:nvGrpSpPr>
+      <p:grpSpPr>
+        <a:xfrm>
+          <a:off x="0" y="0"/>
+          <a:ext cx="0" cy="0"/>
+          <a:chOff x="0" y="0"/>
+          <a:chExt cx="0" cy="0"/>
+        </a:xfrm>
+      </p:grpSpPr>
+      <p:sp>
+        <p:nvSpPr>
+          <p:cNvPr id="2" name="Title 1">
+            <a:extLst>
+              <a:ext uri="{FF2B5EF4-FFF2-40B4-BE49-F238E27FC236}">
+                <a16:creationId xmlns:a16="http://schemas.microsoft.com/office/drawing/2014/main" id="{40E589E5-B223-48FD-B51D-07B91FCCDB6C}"/>
+              </a:ext>
+            </a:extLst>
+          </p:cNvPr>
+          <p:cNvSpPr>
+            <a:spLocks noGrp="1"/>
+          </p:cNvSpPr>
+          <p:nvPr>
+            <p:ph type="title"/>
+          </p:nvPr>
+        </p:nvSpPr>
+        <p:spPr/>
+        <p:txBody>
+          <a:bodyPr/>
+          <a:lstStyle/>
+          <a:p>
+            <a:r>
+              <a:rPr lang="en-US" dirty="0"/>
+              <a:t>Demo</a:t>
+            </a:r>
+          </a:p>
+        </p:txBody>
+      </p:sp>
+      <p:sp>
+        <p:nvSpPr>
+          <p:cNvPr id="3" name="Content Placeholder 2">
+            <a:extLst>
+              <a:ext uri="{FF2B5EF4-FFF2-40B4-BE49-F238E27FC236}">
+                <a16:creationId xmlns:a16="http://schemas.microsoft.com/office/drawing/2014/main" id="{905BB042-0176-4967-A818-AF96F9633F42}"/>
+              </a:ext>
+            </a:extLst>
+          </p:cNvPr>
+          <p:cNvSpPr>
+            <a:spLocks noGrp="1"/>
+          </p:cNvSpPr>
+          <p:nvPr>
+            <p:ph idx="1"/>
+          </p:nvPr>
+        </p:nvSpPr>
+        <p:spPr/>
+        <p:txBody>
+          <a:bodyPr/>
+          <a:lstStyle/>
+          <a:p>
+            <a:r>
+              <a:rPr lang="en-US" dirty="0"/>
+              <a:t>I already built the program once, which loads up the database for persistent use.</a:t>
+            </a:r>
+          </a:p>
+          <a:p>
+            <a:pPr lvl="1"/>
+            <a:r>
+              <a:rPr lang="en-US" dirty="0"/>
+              <a:t>Just run the executable.</a:t>
+            </a:r>
+          </a:p>
+          <a:p>
+            <a:r>
+              <a:rPr lang="en-US" dirty="0"/>
+              <a:t>DEMO TIME!!!</a:t>
+            </a:r>
+          </a:p>
+        </p:txBody>
+      </p:sp>
+    </p:spTree>
+    <p:extLst>
+      <p:ext uri="{BB962C8B-B14F-4D97-AF65-F5344CB8AC3E}">
+        <p14:creationId xmlns:p14="http://schemas.microsoft.com/office/powerpoint/2010/main" val="1910965067"/>
+      </p:ext>
+    </p:extLst>
+  </p:cSld>
+  <p:clrMapOvr>
+    <a:masterClrMapping/>
+  </p:clrMapOvr>
+</p:sld>
+</file>
+
+<file path=ppt/slides/slide5.xml><?xml version="1.0" encoding="utf-8"?>
+<p:sld xmlns:a="http://schemas.openxmlformats.org/drawingml/2006/main" xmlns:r="http://schemas.openxmlformats.org/officeDocument/2006/relationships" xmlns:p="http://schemas.openxmlformats.org/presentationml/2006/main">
+  <p:cSld>
+    <p:spTree>
+      <p:nvGrpSpPr>
+        <p:cNvPr id="1" name=""/>
+        <p:cNvGrpSpPr/>
+        <p:nvPr/>
+      </p:nvGrpSpPr>
+      <p:grpSpPr>
+        <a:xfrm>
+          <a:off x="0" y="0"/>
+          <a:ext cx="0" cy="0"/>
+          <a:chOff x="0" y="0"/>
+          <a:chExt cx="0" cy="0"/>
+        </a:xfrm>
+      </p:grpSpPr>
+      <p:sp>
+        <p:nvSpPr>
+          <p:cNvPr id="2" name="Title 1">
+            <a:extLst>
+              <a:ext uri="{FF2B5EF4-FFF2-40B4-BE49-F238E27FC236}">
+                <a16:creationId xmlns:a16="http://schemas.microsoft.com/office/drawing/2014/main" id="{B12DA148-B56D-4DEF-85A5-950EC192AA2B}"/>
+              </a:ext>
+            </a:extLst>
+          </p:cNvPr>
+          <p:cNvSpPr>
+            <a:spLocks noGrp="1"/>
+          </p:cNvSpPr>
+          <p:nvPr>
+            <p:ph type="title"/>
+          </p:nvPr>
+        </p:nvSpPr>
+        <p:spPr/>
+        <p:txBody>
+          <a:bodyPr/>
+          <a:lstStyle/>
+          <a:p>
+            <a:r>
+              <a:rPr lang="en-US" dirty="0"/>
+              <a:t>Future Work</a:t>
+            </a:r>
+          </a:p>
+        </p:txBody>
+      </p:sp>
+      <p:sp>
+        <p:nvSpPr>
+          <p:cNvPr id="3" name="Content Placeholder 2">
+            <a:extLst>
+              <a:ext uri="{FF2B5EF4-FFF2-40B4-BE49-F238E27FC236}">
+                <a16:creationId xmlns:a16="http://schemas.microsoft.com/office/drawing/2014/main" id="{5BCD8BAB-B5E5-4334-AC5D-51B70CC6C504}"/>
+              </a:ext>
+            </a:extLst>
+          </p:cNvPr>
+          <p:cNvSpPr>
+            <a:spLocks noGrp="1"/>
+          </p:cNvSpPr>
+          <p:nvPr>
+            <p:ph idx="1"/>
+          </p:nvPr>
+        </p:nvSpPr>
+        <p:spPr/>
+        <p:txBody>
+          <a:bodyPr/>
+          <a:lstStyle/>
+          <a:p>
+            <a:r>
+              <a:rPr lang="en-US" sz="2400" dirty="0"/>
+              <a:t>Where are you going to go next?</a:t>
+            </a:r>
+          </a:p>
+          <a:p>
+            <a:pPr marL="450000" lvl="1" indent="0">
+              <a:buNone/>
+            </a:pPr>
+            <a:r>
+              <a:rPr lang="en-US" dirty="0"/>
+              <a:t>The original plan was to have a calendar interface that was clickable and allowed easy viewing and entering, as well as a statistical view that showed overall results for a given time period. Ideally, this would be further developed and brought to fruition for frequent use.</a:t>
+            </a:r>
+          </a:p>
+        </p:txBody>
+      </p:sp>
+    </p:spTree>
+    <p:extLst>
+      <p:ext uri="{BB962C8B-B14F-4D97-AF65-F5344CB8AC3E}">
+        <p14:creationId xmlns:p14="http://schemas.microsoft.com/office/powerpoint/2010/main" val="2577469352"/>
+      </p:ext>
+    </p:extLst>
+  </p:cSld>
+  <p:clrMapOvr>
+    <a:masterClrMapping/>
+  </p:clrMapOvr>
+</p:sld>
+</file>
+
+<file path=ppt/slides/slide6.xml><?xml version="1.0" encoding="utf-8"?>
+<p:sld xmlns:a="http://schemas.openxmlformats.org/drawingml/2006/main" xmlns:r="http://schemas.openxmlformats.org/officeDocument/2006/relationships" xmlns:p="http://schemas.openxmlformats.org/presentationml/2006/main">
+  <p:cSld>
+    <p:spTree>
+      <p:nvGrpSpPr>
+        <p:cNvPr id="1" name=""/>
+        <p:cNvGrpSpPr/>
+        <p:nvPr/>
+      </p:nvGrpSpPr>
+      <p:grpSpPr>
+        <a:xfrm>
+          <a:off x="0" y="0"/>
+          <a:ext cx="0" cy="0"/>
+          <a:chOff x="0" y="0"/>
+          <a:chExt cx="0" cy="0"/>
+        </a:xfrm>
+      </p:grpSpPr>
+      <p:sp>
+        <p:nvSpPr>
+          <p:cNvPr id="2" name="Title 1">
+            <a:extLst>
+              <a:ext uri="{FF2B5EF4-FFF2-40B4-BE49-F238E27FC236}">
+                <a16:creationId xmlns:a16="http://schemas.microsoft.com/office/drawing/2014/main" id="{A6D82069-D520-4961-A214-CB0D4C138127}"/>
+              </a:ext>
+            </a:extLst>
+          </p:cNvPr>
+          <p:cNvSpPr>
+            <a:spLocks noGrp="1"/>
+          </p:cNvSpPr>
+          <p:nvPr>
+            <p:ph type="title"/>
+          </p:nvPr>
+        </p:nvSpPr>
+        <p:spPr/>
+        <p:txBody>
+          <a:bodyPr/>
+          <a:lstStyle/>
+          <a:p>
+            <a:r>
+              <a:rPr lang="en-US" dirty="0"/>
+              <a:t>Questions</a:t>
+            </a:r>
+          </a:p>
+        </p:txBody>
+      </p:sp>
+      <p:sp>
+        <p:nvSpPr>
+          <p:cNvPr id="3" name="Content Placeholder 2">
+            <a:extLst>
+              <a:ext uri="{FF2B5EF4-FFF2-40B4-BE49-F238E27FC236}">
+                <a16:creationId xmlns:a16="http://schemas.microsoft.com/office/drawing/2014/main" id="{9AFD30DC-DC1C-452F-AFE9-20AC9AF8B314}"/>
+              </a:ext>
+            </a:extLst>
+          </p:cNvPr>
+          <p:cNvSpPr>
+            <a:spLocks noGrp="1"/>
+          </p:cNvSpPr>
+          <p:nvPr>
+            <p:ph idx="1"/>
+          </p:nvPr>
+        </p:nvSpPr>
+        <p:spPr/>
+        <p:txBody>
+          <a:bodyPr>
+            <a:normAutofit/>
+          </a:bodyPr>
+          <a:lstStyle/>
+          <a:p>
+            <a:r>
+              <a:rPr lang="en-US" sz="2400" dirty="0"/>
+              <a:t>E-mail: </a:t>
+            </a:r>
+            <a:r>
+              <a:rPr lang="en-US" sz="2400" dirty="0">
+                <a:hlinkClick r:id="rId2"/>
+              </a:rPr>
+              <a:t>jondgons@ut.utm.edu</a:t>
+            </a:r>
+            <a:endParaRPr lang="en-US" sz="2400" dirty="0"/>
+          </a:p>
+          <a:p>
+            <a:r>
+              <a:rPr lang="en-US" sz="2400" dirty="0"/>
+              <a:t>Repo: </a:t>
+            </a:r>
+            <a:r>
+              <a:rPr lang="en-US" sz="2400" dirty="0">
+                <a:hlinkClick r:id="rId3"/>
+              </a:rPr>
+              <a:t>https://github.com/jondgons/Financial-Database-Manager</a:t>
+            </a:r>
+            <a:endParaRPr lang="en-US" sz="2400" dirty="0"/>
+          </a:p>
+        </p:txBody>
+      </p:sp>
+    </p:spTree>
+    <p:extLst>
+      <p:ext uri="{BB962C8B-B14F-4D97-AF65-F5344CB8AC3E}">
+        <p14:creationId xmlns:p14="http://schemas.microsoft.com/office/powerpoint/2010/main" val="1955932254"/>
       </p:ext>
     </p:extLst>
   </p:cSld>

</xml_diff>

<commit_message>
UML updated where relevant database entries expanded for demo purposes
</commit_message>
<xml_diff>
--- a/Documentation/Financial Database Manager.pptx
+++ b/Documentation/Financial Database Manager.pptx
@@ -6158,7 +6158,7 @@
                 <a16:creationId xmlns:a16="http://schemas.microsoft.com/office/drawing/2014/main" id="{608EAA06-5488-416B-B2B2-E55213011012}"/>
               </a:ext>
               <a:ext uri="{C183D7F6-B498-43B3-948B-1728B52AA6E4}">
-                <adec:decorative xmlns:adec="http://schemas.microsoft.com/office/drawing/2017/decorative" xmlns="" val="1"/>
+                <adec:decorative xmlns="" xmlns:adec="http://schemas.microsoft.com/office/drawing/2017/decorative" val="1"/>
               </a:ext>
             </a:extLst>
           </p:cNvPr>
@@ -6332,7 +6332,7 @@
           </a:effectLst>
           <a:extLst>
             <a:ext uri="{91240B29-F687-4f45-9708-019B960494DF}">
-              <a14:hiddenLine xmlns:a16="http://schemas.microsoft.com/office/drawing/2014/main" xmlns:p14="http://schemas.microsoft.com/office/powerpoint/2010/main" xmlns:a14="http://schemas.microsoft.com/office/drawing/2010/main" xmlns="" w="9525">
+              <a14:hiddenLine xmlns="" xmlns:a14="http://schemas.microsoft.com/office/drawing/2010/main" xmlns:p14="http://schemas.microsoft.com/office/powerpoint/2010/main" xmlns:a16="http://schemas.microsoft.com/office/drawing/2014/main" w="9525">
                 <a:solidFill>
                   <a:srgbClr val="000000"/>
                 </a:solidFill>
@@ -6529,7 +6529,7 @@
         <p:spPr/>
         <p:txBody>
           <a:bodyPr>
-            <a:normAutofit/>
+            <a:normAutofit lnSpcReduction="10000"/>
           </a:bodyPr>
           <a:lstStyle/>
           <a:p>
@@ -6574,8 +6574,22 @@
             </a:pPr>
             <a:r>
               <a:rPr lang="en-US" dirty="0"/>
-              <a:t>Build first, then run executable. This way your database plays nice.</a:t>
-            </a:r>
+              <a:t>Build first, then run executable. This way your database plays nice</a:t>
+            </a:r>
+            <a:r>
+              <a:rPr lang="en-US" dirty="0" smtClean="0"/>
+              <a:t>.</a:t>
+            </a:r>
+          </a:p>
+          <a:p>
+            <a:pPr marL="450000" lvl="1" indent="0">
+              <a:buNone/>
+            </a:pPr>
+            <a:r>
+              <a:rPr lang="en-US" dirty="0" smtClean="0"/>
+              <a:t>Refactoring the program resets the database, so be careful!</a:t>
+            </a:r>
+            <a:endParaRPr lang="en-US" dirty="0"/>
           </a:p>
         </p:txBody>
       </p:sp>
@@ -6790,7 +6804,7 @@
       </p:sp>
       <p:pic>
         <p:nvPicPr>
-          <p:cNvPr id="4" name="Content Placeholder 3"/>
+          <p:cNvPr id="8" name="Content Placeholder 7"/>
           <p:cNvPicPr>
             <a:picLocks noGrp="1" noChangeAspect="1"/>
           </p:cNvPicPr>
@@ -6812,8 +6826,8 @@
         </p:blipFill>
         <p:spPr>
           <a:xfrm>
-            <a:off x="1809750" y="2095500"/>
-            <a:ext cx="8562975" cy="3676650"/>
+            <a:off x="1809750" y="2076450"/>
+            <a:ext cx="8562975" cy="3714750"/>
           </a:xfrm>
         </p:spPr>
       </p:pic>
@@ -6905,8 +6919,24 @@
             <a:pPr lvl="1"/>
             <a:r>
               <a:rPr lang="en-US" dirty="0"/>
-              <a:t>Just run the executable.</a:t>
-            </a:r>
+              <a:t>Just run the executable</a:t>
+            </a:r>
+            <a:r>
+              <a:rPr lang="en-US" dirty="0" smtClean="0"/>
+              <a:t>.</a:t>
+            </a:r>
+          </a:p>
+          <a:p>
+            <a:pPr lvl="1"/>
+            <a:r>
+              <a:rPr lang="en-US" dirty="0" smtClean="0"/>
+              <a:t>WARNING: Rebuilding the program resets the database, so be sure </a:t>
+            </a:r>
+            <a:r>
+              <a:rPr lang="en-US" smtClean="0"/>
+              <a:t>to back it up!</a:t>
+            </a:r>
+            <a:endParaRPr lang="en-US" dirty="0"/>
           </a:p>
           <a:p>
             <a:r>

</xml_diff>